<commit_message>
C# DB Advanced - Entity Framework - Exam prep
</commit_message>
<xml_diff>
--- a/C#/DB/Entity Framework Core/05.Entity-Relations/05. DB-Advanced-EF-Core-Entity-Relations.pptx
+++ b/C#/DB/Entity Framework Core/05.Entity-Relations/05. DB-Advanced-EF-Core-Entity-Relations.pptx
@@ -375,7 +375,7 @@
             <a:fld id="{FE5B4EDC-59C0-49C7-8ADA-5A781B329E02}" type="datetimeFigureOut">
               <a:rPr lang="en-US"/>
               <a:pPr/>
-              <a:t>11/4/2019</a:t>
+              <a:t>11/30/2019</a:t>
             </a:fld>
             <a:endParaRPr dirty="0"/>
           </a:p>
@@ -574,7 +574,7 @@
             <a:fld id="{F2D8D46A-B586-417D-BFBD-8C8FE0AAF762}" type="datetimeFigureOut">
               <a:rPr lang="en-US" smtClean="0"/>
               <a:pPr/>
-              <a:t>11/4/2019</a:t>
+              <a:t>11/30/2019</a:t>
             </a:fld>
             <a:endParaRPr lang="en-US" dirty="0"/>
           </a:p>
@@ -3968,7 +3968,7 @@
             <a:fld id="{055373AC-9AA7-423B-BA00-BA1C74164DBD}" type="datetime1">
               <a:rPr lang="en-US" smtClean="0"/>
               <a:pPr/>
-              <a:t>11/4/2019</a:t>
+              <a:t>11/30/2019</a:t>
             </a:fld>
             <a:endParaRPr lang="en-US" dirty="0"/>
           </a:p>
@@ -4971,7 +4971,7 @@
             <a:fld id="{055373AC-9AA7-423B-BA00-BA1C74164DBD}" type="datetime1">
               <a:rPr lang="en-US" smtClean="0"/>
               <a:pPr/>
-              <a:t>11/4/2019</a:t>
+              <a:t>11/30/2019</a:t>
             </a:fld>
             <a:endParaRPr lang="en-US" dirty="0"/>
           </a:p>
@@ -5900,7 +5900,7 @@
             <a:fld id="{055373AC-9AA7-423B-BA00-BA1C74164DBD}" type="datetime1">
               <a:rPr lang="en-US" smtClean="0"/>
               <a:pPr/>
-              <a:t>11/4/2019</a:t>
+              <a:t>11/30/2019</a:t>
             </a:fld>
             <a:endParaRPr lang="en-US" dirty="0"/>
           </a:p>
@@ -6086,7 +6086,7 @@
             <a:fld id="{055373AC-9AA7-423B-BA00-BA1C74164DBD}" type="datetime1">
               <a:rPr lang="en-US" smtClean="0"/>
               <a:pPr/>
-              <a:t>11/4/2019</a:t>
+              <a:t>11/30/2019</a:t>
             </a:fld>
             <a:endParaRPr lang="en-US" dirty="0"/>
           </a:p>
@@ -6672,7 +6672,7 @@
             <a:fld id="{055373AC-9AA7-423B-BA00-BA1C74164DBD}" type="datetime1">
               <a:rPr lang="en-US" smtClean="0"/>
               <a:pPr/>
-              <a:t>11/4/2019</a:t>
+              <a:t>11/30/2019</a:t>
             </a:fld>
             <a:endParaRPr lang="en-US" dirty="0"/>
           </a:p>
@@ -7386,7 +7386,7 @@
             <a:fld id="{055373AC-9AA7-423B-BA00-BA1C74164DBD}" type="datetime1">
               <a:rPr lang="en-US" smtClean="0"/>
               <a:pPr/>
-              <a:t>11/4/2019</a:t>
+              <a:t>11/30/2019</a:t>
             </a:fld>
             <a:endParaRPr lang="en-US" dirty="0"/>
           </a:p>
@@ -7797,7 +7797,7 @@
             <a:fld id="{055373AC-9AA7-423B-BA00-BA1C74164DBD}" type="datetime1">
               <a:rPr lang="en-US" smtClean="0"/>
               <a:pPr/>
-              <a:t>11/4/2019</a:t>
+              <a:t>11/30/2019</a:t>
             </a:fld>
             <a:endParaRPr lang="en-US" dirty="0"/>
           </a:p>
@@ -8166,7 +8166,7 @@
             <a:fld id="{055373AC-9AA7-423B-BA00-BA1C74164DBD}" type="datetime1">
               <a:rPr lang="en-US" smtClean="0"/>
               <a:pPr/>
-              <a:t>11/4/2019</a:t>
+              <a:t>11/30/2019</a:t>
             </a:fld>
             <a:endParaRPr lang="en-US" dirty="0"/>
           </a:p>
@@ -8834,7 +8834,7 @@
             <a:fld id="{055373AC-9AA7-423B-BA00-BA1C74164DBD}" type="datetime1">
               <a:rPr lang="en-US" smtClean="0"/>
               <a:pPr/>
-              <a:t>11/4/2019</a:t>
+              <a:t>11/30/2019</a:t>
             </a:fld>
             <a:endParaRPr lang="en-US" dirty="0"/>
           </a:p>
@@ -9295,7 +9295,7 @@
             <a:fld id="{055373AC-9AA7-423B-BA00-BA1C74164DBD}" type="datetime1">
               <a:rPr lang="en-US" smtClean="0"/>
               <a:pPr/>
-              <a:t>11/4/2019</a:t>
+              <a:t>11/30/2019</a:t>
             </a:fld>
             <a:endParaRPr lang="en-US" dirty="0"/>
           </a:p>
@@ -9479,7 +9479,7 @@
             <a:fld id="{055373AC-9AA7-423B-BA00-BA1C74164DBD}" type="datetime1">
               <a:rPr lang="en-US" smtClean="0"/>
               <a:pPr/>
-              <a:t>11/4/2019</a:t>
+              <a:t>11/30/2019</a:t>
             </a:fld>
             <a:endParaRPr lang="en-US" dirty="0"/>
           </a:p>
@@ -10070,12 +10070,8 @@
           <a:lstStyle/>
           <a:p>
             <a:r>
-              <a:rPr lang="en-US"/>
-              <a:t>Entity </a:t>
-            </a:r>
-            <a:r>
               <a:rPr lang="en-US" dirty="0"/>
-              <a:t>Relations</a:t>
+              <a:t>Entity Relations</a:t>
             </a:r>
           </a:p>
         </p:txBody>
@@ -10313,10 +10309,9 @@
           <a:lstStyle/>
           <a:p>
             <a:r>
-              <a:rPr lang="en-US"/>
+              <a:rPr lang="en-US" dirty="0"/>
               <a:t>Fluent API: Renaming DB Objects</a:t>
             </a:r>
-            <a:endParaRPr lang="en-US" dirty="0"/>
           </a:p>
         </p:txBody>
       </p:sp>
@@ -11065,10 +11060,9 @@
           <a:lstStyle/>
           <a:p>
             <a:r>
-              <a:rPr lang="en-US"/>
+              <a:rPr lang="en-US" dirty="0"/>
               <a:t>Fluent API: Column Attributes</a:t>
             </a:r>
-            <a:endParaRPr lang="en-US" dirty="0"/>
           </a:p>
         </p:txBody>
       </p:sp>
@@ -12020,8 +12014,12 @@
           <a:lstStyle/>
           <a:p>
             <a:r>
-              <a:rPr lang="en-US"/>
-              <a:t>Fluent API: Miscellaneous Config</a:t>
+              <a:rPr lang="en-US" dirty="0"/>
+              <a:t>Fluent API: Miscellaneous </a:t>
+            </a:r>
+            <a:r>
+              <a:rPr lang="en-US" dirty="0" err="1"/>
+              <a:t>Config</a:t>
             </a:r>
             <a:endParaRPr lang="en-US" dirty="0"/>
           </a:p>
@@ -12826,10 +12824,9 @@
           <a:lstStyle/>
           <a:p>
             <a:r>
-              <a:rPr lang="en-US"/>
+              <a:rPr lang="en-US" dirty="0"/>
               <a:t>Specialized Configuration Classes</a:t>
             </a:r>
-            <a:endParaRPr lang="en-US" dirty="0"/>
           </a:p>
         </p:txBody>
       </p:sp>
@@ -13795,10 +13792,9 @@
           <a:lstStyle/>
           <a:p>
             <a:r>
-              <a:rPr lang="en-US"/>
+              <a:rPr lang="en-US" dirty="0"/>
               <a:t>One-to-Zero-or-One</a:t>
             </a:r>
-            <a:endParaRPr lang="en-US" dirty="0"/>
           </a:p>
         </p:txBody>
       </p:sp>
@@ -15870,10 +15866,9 @@
           <a:lstStyle/>
           <a:p>
             <a:r>
-              <a:rPr lang="en-US"/>
+              <a:rPr lang="en-US" dirty="0"/>
               <a:t>One-to-Zero-or-One: Fluent API</a:t>
             </a:r>
-            <a:endParaRPr lang="en-US" dirty="0"/>
           </a:p>
         </p:txBody>
       </p:sp>
@@ -16670,10 +16665,9 @@
           <a:lstStyle/>
           <a:p>
             <a:r>
-              <a:rPr lang="en-US"/>
+              <a:rPr lang="en-US" dirty="0"/>
               <a:t>One-to-Many</a:t>
             </a:r>
-            <a:endParaRPr lang="en-US" dirty="0"/>
           </a:p>
         </p:txBody>
       </p:sp>
@@ -17887,10 +17881,9 @@
           <a:lstStyle/>
           <a:p>
             <a:r>
-              <a:rPr lang="en-US"/>
+              <a:rPr lang="en-US" dirty="0"/>
               <a:t>One-to-Many: Implementation</a:t>
             </a:r>
-            <a:endParaRPr lang="en-US" dirty="0"/>
           </a:p>
         </p:txBody>
       </p:sp>
@@ -18780,10 +18773,9 @@
           <a:lstStyle/>
           <a:p>
             <a:r>
-              <a:rPr lang="en-US"/>
+              <a:rPr lang="en-US" dirty="0"/>
               <a:t>One-to-Many: Fluent API</a:t>
             </a:r>
-            <a:endParaRPr lang="en-US" dirty="0"/>
           </a:p>
         </p:txBody>
       </p:sp>
@@ -19563,10 +19555,9 @@
           <a:lstStyle/>
           <a:p>
             <a:r>
-              <a:rPr lang="en-US"/>
+              <a:rPr lang="en-US" dirty="0"/>
               <a:t>Many-to-Many</a:t>
             </a:r>
-            <a:endParaRPr lang="en-US" dirty="0"/>
           </a:p>
         </p:txBody>
       </p:sp>
@@ -20516,10 +20507,9 @@
           <a:lstStyle/>
           <a:p>
             <a:r>
-              <a:rPr lang="en-US"/>
+              <a:rPr lang="en-US" dirty="0"/>
               <a:t>Many-to-Many Implementation (1)</a:t>
             </a:r>
-            <a:endParaRPr lang="en-US" dirty="0"/>
           </a:p>
         </p:txBody>
       </p:sp>
@@ -21150,10 +21140,9 @@
           <a:lstStyle/>
           <a:p>
             <a:r>
-              <a:rPr lang="en-US"/>
+              <a:rPr lang="en-US" dirty="0"/>
               <a:t>Many-to-Many Implementation (2)</a:t>
             </a:r>
-            <a:endParaRPr lang="en-US" dirty="0"/>
           </a:p>
         </p:txBody>
       </p:sp>
@@ -21721,10 +21710,9 @@
           <a:lstStyle/>
           <a:p>
             <a:r>
-              <a:rPr lang="en-US"/>
+              <a:rPr lang="en-US" dirty="0"/>
               <a:t>Many-to-Many: Fluent API</a:t>
             </a:r>
-            <a:endParaRPr lang="en-US" dirty="0"/>
           </a:p>
         </p:txBody>
       </p:sp>
@@ -22924,10 +22912,9 @@
           <a:lstStyle/>
           <a:p>
             <a:r>
-              <a:rPr lang="en-US"/>
+              <a:rPr lang="en-US" dirty="0"/>
               <a:t>Multiple Relations</a:t>
             </a:r>
-            <a:endParaRPr lang="en-US" dirty="0"/>
           </a:p>
         </p:txBody>
       </p:sp>
@@ -23729,10 +23716,9 @@
           <a:lstStyle/>
           <a:p>
             <a:r>
-              <a:rPr lang="en-US"/>
+              <a:rPr lang="en-US" dirty="0"/>
               <a:t>Multiple Relations Implementation</a:t>
             </a:r>
-            <a:endParaRPr lang="en-US" dirty="0"/>
           </a:p>
         </p:txBody>
       </p:sp>
@@ -24229,10 +24215,9 @@
           <a:lstStyle/>
           <a:p>
             <a:r>
-              <a:rPr lang="en-US"/>
+              <a:rPr lang="en-US" dirty="0"/>
               <a:t>Multiple Relations Implementation (2)</a:t>
             </a:r>
-            <a:endParaRPr lang="en-US" dirty="0"/>
           </a:p>
         </p:txBody>
       </p:sp>
@@ -25224,10 +25209,9 @@
           <a:lstStyle/>
           <a:p>
             <a:r>
-              <a:rPr lang="en-US"/>
+              <a:rPr lang="en-US" dirty="0"/>
               <a:t>Good Reasons to Use Select</a:t>
             </a:r>
-            <a:endParaRPr lang="en-US" dirty="0"/>
           </a:p>
         </p:txBody>
       </p:sp>
@@ -26340,10 +26324,9 @@
           <a:lstStyle/>
           <a:p>
             <a:r>
-              <a:rPr lang="en-US"/>
+              <a:rPr lang="en-US" dirty="0"/>
               <a:t>Joining Tables in EF: Using Join()</a:t>
             </a:r>
-            <a:endParaRPr lang="en-US" dirty="0"/>
           </a:p>
         </p:txBody>
       </p:sp>
@@ -27172,10 +27155,9 @@
           <a:lstStyle/>
           <a:p>
             <a:r>
-              <a:rPr lang="en-US"/>
+              <a:rPr lang="en-US" dirty="0"/>
               <a:t>Grouping Tables in EF</a:t>
             </a:r>
-            <a:endParaRPr lang="en-US" dirty="0"/>
           </a:p>
         </p:txBody>
       </p:sp>
@@ -27911,10 +27893,9 @@
           <a:lstStyle/>
           <a:p>
             <a:r>
-              <a:rPr lang="en-US"/>
+              <a:rPr lang="en-US" dirty="0"/>
               <a:t>Simplifying Models</a:t>
             </a:r>
-            <a:endParaRPr lang="en-US" dirty="0"/>
           </a:p>
         </p:txBody>
       </p:sp>
@@ -29074,10 +29055,9 @@
           <a:lstStyle/>
           <a:p>
             <a:r>
-              <a:rPr lang="en-US"/>
+              <a:rPr lang="en-US" dirty="0"/>
               <a:t>Custom Entity Framework Behavior</a:t>
             </a:r>
-            <a:endParaRPr lang="en-US" dirty="0"/>
           </a:p>
         </p:txBody>
       </p:sp>
@@ -29938,10 +29918,9 @@
           <a:lstStyle/>
           <a:p>
             <a:r>
-              <a:rPr lang="en-US"/>
+              <a:rPr lang="en-US" dirty="0"/>
               <a:t>Key Attributes</a:t>
             </a:r>
-            <a:endParaRPr lang="en-US" dirty="0"/>
           </a:p>
         </p:txBody>
       </p:sp>
@@ -31057,10 +31036,9 @@
           <a:lstStyle/>
           <a:p>
             <a:r>
-              <a:rPr lang="en-US"/>
+              <a:rPr lang="en-US" dirty="0"/>
               <a:t>Renaming Objects</a:t>
             </a:r>
-            <a:endParaRPr lang="en-US" dirty="0"/>
           </a:p>
         </p:txBody>
       </p:sp>
@@ -35287,10 +35265,9 @@
           <a:lstStyle/>
           <a:p>
             <a:r>
-              <a:rPr lang="en-US"/>
+              <a:rPr lang="en-US" dirty="0"/>
               <a:t>Object Composition</a:t>
             </a:r>
-            <a:endParaRPr lang="en-US" dirty="0"/>
           </a:p>
         </p:txBody>
       </p:sp>
@@ -39884,10 +39861,9 @@
           <a:lstStyle/>
           <a:p>
             <a:r>
-              <a:rPr lang="en-US"/>
+              <a:rPr lang="en-US" dirty="0"/>
               <a:t>Working with Fluent API</a:t>
             </a:r>
-            <a:endParaRPr lang="en-US" dirty="0"/>
           </a:p>
         </p:txBody>
       </p:sp>

</xml_diff>